<commit_message>
High resolution texture and blocks
The texture has been redesigned with high resolution. The blocks have been
remodelled with fewer polygons
</commit_message>
<xml_diff>
--- a/texture/blocks/editable/blocks.pptx
+++ b/texture/blocks/editable/blocks.pptx
@@ -243,7 +243,7 @@
           <a:p>
             <a:fld id="{748D4621-9A43-44E5-A4CA-FA760060489C}" type="datetimeFigureOut">
               <a:rPr lang="en-US" smtClean="0"/>
-              <a:t>6/25/2018</a:t>
+              <a:t>7/10/2018</a:t>
             </a:fld>
             <a:endParaRPr lang="en-US"/>
           </a:p>
@@ -413,7 +413,7 @@
           <a:p>
             <a:fld id="{748D4621-9A43-44E5-A4CA-FA760060489C}" type="datetimeFigureOut">
               <a:rPr lang="en-US" smtClean="0"/>
-              <a:t>6/25/2018</a:t>
+              <a:t>7/10/2018</a:t>
             </a:fld>
             <a:endParaRPr lang="en-US"/>
           </a:p>
@@ -593,7 +593,7 @@
           <a:p>
             <a:fld id="{748D4621-9A43-44E5-A4CA-FA760060489C}" type="datetimeFigureOut">
               <a:rPr lang="en-US" smtClean="0"/>
-              <a:t>6/25/2018</a:t>
+              <a:t>7/10/2018</a:t>
             </a:fld>
             <a:endParaRPr lang="en-US"/>
           </a:p>
@@ -763,7 +763,7 @@
           <a:p>
             <a:fld id="{748D4621-9A43-44E5-A4CA-FA760060489C}" type="datetimeFigureOut">
               <a:rPr lang="en-US" smtClean="0"/>
-              <a:t>6/25/2018</a:t>
+              <a:t>7/10/2018</a:t>
             </a:fld>
             <a:endParaRPr lang="en-US"/>
           </a:p>
@@ -1009,7 +1009,7 @@
           <a:p>
             <a:fld id="{748D4621-9A43-44E5-A4CA-FA760060489C}" type="datetimeFigureOut">
               <a:rPr lang="en-US" smtClean="0"/>
-              <a:t>6/25/2018</a:t>
+              <a:t>7/10/2018</a:t>
             </a:fld>
             <a:endParaRPr lang="en-US"/>
           </a:p>
@@ -1241,7 +1241,7 @@
           <a:p>
             <a:fld id="{748D4621-9A43-44E5-A4CA-FA760060489C}" type="datetimeFigureOut">
               <a:rPr lang="en-US" smtClean="0"/>
-              <a:t>6/25/2018</a:t>
+              <a:t>7/10/2018</a:t>
             </a:fld>
             <a:endParaRPr lang="en-US"/>
           </a:p>
@@ -1608,7 +1608,7 @@
           <a:p>
             <a:fld id="{748D4621-9A43-44E5-A4CA-FA760060489C}" type="datetimeFigureOut">
               <a:rPr lang="en-US" smtClean="0"/>
-              <a:t>6/25/2018</a:t>
+              <a:t>7/10/2018</a:t>
             </a:fld>
             <a:endParaRPr lang="en-US"/>
           </a:p>
@@ -1726,7 +1726,7 @@
           <a:p>
             <a:fld id="{748D4621-9A43-44E5-A4CA-FA760060489C}" type="datetimeFigureOut">
               <a:rPr lang="en-US" smtClean="0"/>
-              <a:t>6/25/2018</a:t>
+              <a:t>7/10/2018</a:t>
             </a:fld>
             <a:endParaRPr lang="en-US"/>
           </a:p>
@@ -1821,7 +1821,7 @@
           <a:p>
             <a:fld id="{748D4621-9A43-44E5-A4CA-FA760060489C}" type="datetimeFigureOut">
               <a:rPr lang="en-US" smtClean="0"/>
-              <a:t>6/25/2018</a:t>
+              <a:t>7/10/2018</a:t>
             </a:fld>
             <a:endParaRPr lang="en-US"/>
           </a:p>
@@ -2098,7 +2098,7 @@
           <a:p>
             <a:fld id="{748D4621-9A43-44E5-A4CA-FA760060489C}" type="datetimeFigureOut">
               <a:rPr lang="en-US" smtClean="0"/>
-              <a:t>6/25/2018</a:t>
+              <a:t>7/10/2018</a:t>
             </a:fld>
             <a:endParaRPr lang="en-US"/>
           </a:p>
@@ -2351,7 +2351,7 @@
           <a:p>
             <a:fld id="{748D4621-9A43-44E5-A4CA-FA760060489C}" type="datetimeFigureOut">
               <a:rPr lang="en-US" smtClean="0"/>
-              <a:t>6/25/2018</a:t>
+              <a:t>7/10/2018</a:t>
             </a:fld>
             <a:endParaRPr lang="en-US"/>
           </a:p>
@@ -2564,7 +2564,7 @@
           <a:p>
             <a:fld id="{748D4621-9A43-44E5-A4CA-FA760060489C}" type="datetimeFigureOut">
               <a:rPr lang="en-US" smtClean="0"/>
-              <a:t>6/25/2018</a:t>
+              <a:t>7/10/2018</a:t>
             </a:fld>
             <a:endParaRPr lang="en-US"/>
           </a:p>
@@ -2971,14 +2971,14 @@
       </p:grpSpPr>
       <p:sp>
         <p:nvSpPr>
-          <p:cNvPr id="5" name="Rectangle 4"/>
+          <p:cNvPr id="2" name="Rectangle 1"/>
           <p:cNvSpPr/>
           <p:nvPr/>
         </p:nvSpPr>
         <p:spPr>
           <a:xfrm>
-            <a:off x="64008" y="38368"/>
-            <a:ext cx="2940902" cy="1600712"/>
+            <a:off x="0" y="0"/>
+            <a:ext cx="12192000" cy="7242048"/>
           </a:xfrm>
           <a:prstGeom prst="rect">
             <a:avLst/>
@@ -2987,13 +2987,6 @@
             <a:blip r:embed="rId2"/>
             <a:tile tx="0" ty="0" sx="100000" sy="100000" flip="none" algn="tl"/>
           </a:blipFill>
-          <a:ln>
-            <a:solidFill>
-              <a:schemeClr val="tx1"/>
-            </a:solidFill>
-            <a:prstDash val="lgDash"/>
-          </a:ln>
-          <a:effectLst/>
         </p:spPr>
         <p:style>
           <a:lnRef idx="2">
@@ -3016,47 +3009,41 @@
           <a:lstStyle/>
           <a:p>
             <a:pPr algn="ctr"/>
-            <a:r>
-              <a:rPr lang="en-US" sz="6600" dirty="0" smtClean="0">
-                <a:solidFill>
-                  <a:schemeClr val="tx1"/>
-                </a:solidFill>
-              </a:rPr>
-              <a:t>1</a:t>
-            </a:r>
-            <a:endParaRPr lang="en-US" sz="6600" dirty="0">
-              <a:solidFill>
-                <a:schemeClr val="tx1"/>
-              </a:solidFill>
-            </a:endParaRPr>
-          </a:p>
-        </p:txBody>
-      </p:sp>
-      <p:sp>
-        <p:nvSpPr>
-          <p:cNvPr id="8" name="Rectangle 7"/>
+            <a:endParaRPr lang="en-US" sz="9600"/>
+          </a:p>
+        </p:txBody>
+      </p:sp>
+      <p:sp>
+        <p:nvSpPr>
+          <p:cNvPr id="5" name="Rectangle 4"/>
           <p:cNvSpPr/>
           <p:nvPr/>
         </p:nvSpPr>
         <p:spPr>
           <a:xfrm>
-            <a:off x="3068918" y="38368"/>
-            <a:ext cx="2940902" cy="1600712"/>
+            <a:off x="64006" y="38367"/>
+            <a:ext cx="2940902" cy="1900601"/>
           </a:xfrm>
           <a:prstGeom prst="rect">
             <a:avLst/>
           </a:prstGeom>
-          <a:blipFill>
-            <a:blip r:embed="rId2"/>
-            <a:tile tx="0" ty="0" sx="100000" sy="100000" flip="none" algn="tl"/>
-          </a:blipFill>
+          <a:solidFill>
+            <a:schemeClr val="bg1">
+              <a:lumMod val="95000"/>
+            </a:schemeClr>
+          </a:solidFill>
           <a:ln>
-            <a:solidFill>
-              <a:schemeClr val="tx1"/>
-            </a:solidFill>
+            <a:noFill/>
             <a:prstDash val="lgDash"/>
           </a:ln>
-          <a:effectLst/>
+          <a:effectLst>
+            <a:outerShdw blurRad="50800" dist="38100" dir="2700000" algn="tl" rotWithShape="0">
+              <a:prstClr val="black">
+                <a:alpha val="40000"/>
+              </a:prstClr>
+            </a:outerShdw>
+            <a:softEdge rad="635000"/>
+          </a:effectLst>
         </p:spPr>
         <p:style>
           <a:lnRef idx="2">
@@ -3080,14 +3067,14 @@
           <a:p>
             <a:pPr algn="ctr"/>
             <a:r>
-              <a:rPr lang="en-US" sz="6600" dirty="0" smtClean="0">
+              <a:rPr lang="en-US" sz="9600" dirty="0" smtClean="0">
                 <a:solidFill>
                   <a:schemeClr val="tx1"/>
                 </a:solidFill>
               </a:rPr>
-              <a:t>2</a:t>
-            </a:r>
-            <a:endParaRPr lang="en-US" sz="6600" dirty="0">
+              <a:t>1</a:t>
+            </a:r>
+            <a:endParaRPr lang="en-US" sz="9600" dirty="0">
               <a:solidFill>
                 <a:schemeClr val="tx1"/>
               </a:solidFill>
@@ -3097,29 +3084,35 @@
       </p:sp>
       <p:sp>
         <p:nvSpPr>
-          <p:cNvPr id="9" name="Rectangle 8"/>
+          <p:cNvPr id="8" name="Rectangle 7"/>
           <p:cNvSpPr/>
           <p:nvPr/>
         </p:nvSpPr>
         <p:spPr>
           <a:xfrm>
-            <a:off x="6073828" y="38368"/>
-            <a:ext cx="2940902" cy="1600712"/>
+            <a:off x="3068918" y="38368"/>
+            <a:ext cx="2940902" cy="1900600"/>
           </a:xfrm>
           <a:prstGeom prst="rect">
             <a:avLst/>
           </a:prstGeom>
-          <a:blipFill>
-            <a:blip r:embed="rId2"/>
-            <a:tile tx="0" ty="0" sx="100000" sy="100000" flip="none" algn="tl"/>
-          </a:blipFill>
+          <a:solidFill>
+            <a:schemeClr val="bg1">
+              <a:lumMod val="95000"/>
+            </a:schemeClr>
+          </a:solidFill>
           <a:ln>
-            <a:solidFill>
-              <a:schemeClr val="tx1"/>
-            </a:solidFill>
+            <a:noFill/>
             <a:prstDash val="lgDash"/>
           </a:ln>
-          <a:effectLst/>
+          <a:effectLst>
+            <a:outerShdw blurRad="50800" dist="38100" dir="2700000" algn="tl" rotWithShape="0">
+              <a:prstClr val="black">
+                <a:alpha val="40000"/>
+              </a:prstClr>
+            </a:outerShdw>
+            <a:softEdge rad="635000"/>
+          </a:effectLst>
         </p:spPr>
         <p:style>
           <a:lnRef idx="2">
@@ -3143,14 +3136,14 @@
           <a:p>
             <a:pPr algn="ctr"/>
             <a:r>
-              <a:rPr lang="en-US" sz="6600" dirty="0" smtClean="0">
+              <a:rPr lang="en-US" sz="9600" dirty="0" smtClean="0">
                 <a:solidFill>
                   <a:schemeClr val="tx1"/>
                 </a:solidFill>
               </a:rPr>
-              <a:t>3</a:t>
-            </a:r>
-            <a:endParaRPr lang="en-US" sz="6600" dirty="0">
+              <a:t>2</a:t>
+            </a:r>
+            <a:endParaRPr lang="en-US" sz="9600" dirty="0">
               <a:solidFill>
                 <a:schemeClr val="tx1"/>
               </a:solidFill>
@@ -3160,29 +3153,35 @@
       </p:sp>
       <p:sp>
         <p:nvSpPr>
-          <p:cNvPr id="12" name="Rectangle 11"/>
+          <p:cNvPr id="9" name="Rectangle 8"/>
           <p:cNvSpPr/>
           <p:nvPr/>
         </p:nvSpPr>
         <p:spPr>
           <a:xfrm>
-            <a:off x="9078738" y="38368"/>
-            <a:ext cx="2940902" cy="1600712"/>
+            <a:off x="6073828" y="38368"/>
+            <a:ext cx="2940902" cy="1900600"/>
           </a:xfrm>
           <a:prstGeom prst="rect">
             <a:avLst/>
           </a:prstGeom>
-          <a:blipFill>
-            <a:blip r:embed="rId2"/>
-            <a:tile tx="0" ty="0" sx="100000" sy="100000" flip="none" algn="tl"/>
-          </a:blipFill>
+          <a:solidFill>
+            <a:schemeClr val="bg1">
+              <a:lumMod val="95000"/>
+            </a:schemeClr>
+          </a:solidFill>
           <a:ln>
-            <a:solidFill>
-              <a:schemeClr val="tx1"/>
-            </a:solidFill>
+            <a:noFill/>
             <a:prstDash val="lgDash"/>
           </a:ln>
-          <a:effectLst/>
+          <a:effectLst>
+            <a:outerShdw blurRad="50800" dist="38100" dir="2700000" algn="tl" rotWithShape="0">
+              <a:prstClr val="black">
+                <a:alpha val="40000"/>
+              </a:prstClr>
+            </a:outerShdw>
+            <a:softEdge rad="635000"/>
+          </a:effectLst>
         </p:spPr>
         <p:style>
           <a:lnRef idx="2">
@@ -3206,14 +3205,14 @@
           <a:p>
             <a:pPr algn="ctr"/>
             <a:r>
-              <a:rPr lang="en-US" sz="6600" dirty="0" smtClean="0">
+              <a:rPr lang="en-US" sz="9600" dirty="0" smtClean="0">
                 <a:solidFill>
                   <a:schemeClr val="tx1"/>
                 </a:solidFill>
               </a:rPr>
-              <a:t>4</a:t>
-            </a:r>
-            <a:endParaRPr lang="en-US" sz="6600" dirty="0">
+              <a:t>3</a:t>
+            </a:r>
+            <a:endParaRPr lang="en-US" sz="9600" dirty="0">
               <a:solidFill>
                 <a:schemeClr val="tx1"/>
               </a:solidFill>
@@ -3223,29 +3222,35 @@
       </p:sp>
       <p:sp>
         <p:nvSpPr>
-          <p:cNvPr id="13" name="Rectangle 12"/>
+          <p:cNvPr id="12" name="Rectangle 11"/>
           <p:cNvSpPr/>
           <p:nvPr/>
         </p:nvSpPr>
         <p:spPr>
           <a:xfrm>
-            <a:off x="64008" y="1718944"/>
-            <a:ext cx="2940902" cy="1592720"/>
+            <a:off x="9078738" y="38367"/>
+            <a:ext cx="2940902" cy="2076871"/>
           </a:xfrm>
           <a:prstGeom prst="rect">
             <a:avLst/>
           </a:prstGeom>
-          <a:blipFill>
-            <a:blip r:embed="rId2"/>
-            <a:tile tx="0" ty="0" sx="100000" sy="100000" flip="none" algn="tl"/>
-          </a:blipFill>
+          <a:solidFill>
+            <a:schemeClr val="bg1">
+              <a:lumMod val="95000"/>
+            </a:schemeClr>
+          </a:solidFill>
           <a:ln>
-            <a:solidFill>
-              <a:schemeClr val="tx1"/>
-            </a:solidFill>
+            <a:noFill/>
             <a:prstDash val="lgDash"/>
           </a:ln>
-          <a:effectLst/>
+          <a:effectLst>
+            <a:outerShdw blurRad="50800" dist="38100" dir="2700000" algn="tl" rotWithShape="0">
+              <a:prstClr val="black">
+                <a:alpha val="40000"/>
+              </a:prstClr>
+            </a:outerShdw>
+            <a:softEdge rad="635000"/>
+          </a:effectLst>
         </p:spPr>
         <p:style>
           <a:lnRef idx="2">
@@ -3269,14 +3274,14 @@
           <a:p>
             <a:pPr algn="ctr"/>
             <a:r>
-              <a:rPr lang="en-US" sz="6600" dirty="0" smtClean="0">
+              <a:rPr lang="en-US" sz="9600" dirty="0" smtClean="0">
                 <a:solidFill>
                   <a:schemeClr val="tx1"/>
                 </a:solidFill>
               </a:rPr>
-              <a:t>5</a:t>
-            </a:r>
-            <a:endParaRPr lang="en-US" sz="6600" dirty="0">
+              <a:t>4</a:t>
+            </a:r>
+            <a:endParaRPr lang="en-US" sz="9600" dirty="0">
               <a:solidFill>
                 <a:schemeClr val="tx1"/>
               </a:solidFill>
@@ -3286,29 +3291,35 @@
       </p:sp>
       <p:sp>
         <p:nvSpPr>
-          <p:cNvPr id="14" name="Rectangle 13"/>
+          <p:cNvPr id="13" name="Rectangle 12"/>
           <p:cNvSpPr/>
           <p:nvPr/>
         </p:nvSpPr>
         <p:spPr>
           <a:xfrm>
-            <a:off x="3068917" y="1718944"/>
-            <a:ext cx="2940902" cy="1592720"/>
+            <a:off x="64008" y="1718943"/>
+            <a:ext cx="2940902" cy="1793139"/>
           </a:xfrm>
           <a:prstGeom prst="rect">
             <a:avLst/>
           </a:prstGeom>
-          <a:blipFill>
-            <a:blip r:embed="rId2"/>
-            <a:tile tx="0" ty="0" sx="100000" sy="100000" flip="none" algn="tl"/>
-          </a:blipFill>
+          <a:solidFill>
+            <a:schemeClr val="bg1">
+              <a:lumMod val="95000"/>
+            </a:schemeClr>
+          </a:solidFill>
           <a:ln>
-            <a:solidFill>
-              <a:schemeClr val="tx1"/>
-            </a:solidFill>
+            <a:noFill/>
             <a:prstDash val="lgDash"/>
           </a:ln>
-          <a:effectLst/>
+          <a:effectLst>
+            <a:outerShdw blurRad="50800" dist="38100" dir="2700000" algn="tl" rotWithShape="0">
+              <a:prstClr val="black">
+                <a:alpha val="40000"/>
+              </a:prstClr>
+            </a:outerShdw>
+            <a:softEdge rad="635000"/>
+          </a:effectLst>
         </p:spPr>
         <p:style>
           <a:lnRef idx="2">
@@ -3332,14 +3343,14 @@
           <a:p>
             <a:pPr algn="ctr"/>
             <a:r>
-              <a:rPr lang="en-US" sz="6600" dirty="0" smtClean="0">
+              <a:rPr lang="en-US" sz="9600" dirty="0" smtClean="0">
                 <a:solidFill>
                   <a:schemeClr val="tx1"/>
                 </a:solidFill>
               </a:rPr>
-              <a:t>6</a:t>
-            </a:r>
-            <a:endParaRPr lang="en-US" sz="6600" dirty="0">
+              <a:t>5</a:t>
+            </a:r>
+            <a:endParaRPr lang="en-US" sz="9600" dirty="0">
               <a:solidFill>
                 <a:schemeClr val="tx1"/>
               </a:solidFill>
@@ -3349,29 +3360,35 @@
       </p:sp>
       <p:sp>
         <p:nvSpPr>
-          <p:cNvPr id="15" name="Rectangle 14"/>
+          <p:cNvPr id="14" name="Rectangle 13"/>
           <p:cNvSpPr/>
           <p:nvPr/>
         </p:nvSpPr>
         <p:spPr>
           <a:xfrm>
-            <a:off x="6073826" y="1718944"/>
-            <a:ext cx="2940902" cy="1584344"/>
+            <a:off x="3068917" y="1718943"/>
+            <a:ext cx="2940902" cy="1793139"/>
           </a:xfrm>
           <a:prstGeom prst="rect">
             <a:avLst/>
           </a:prstGeom>
-          <a:blipFill>
-            <a:blip r:embed="rId2"/>
-            <a:tile tx="0" ty="0" sx="100000" sy="100000" flip="none" algn="tl"/>
-          </a:blipFill>
+          <a:solidFill>
+            <a:schemeClr val="bg1">
+              <a:lumMod val="95000"/>
+            </a:schemeClr>
+          </a:solidFill>
           <a:ln>
-            <a:solidFill>
-              <a:schemeClr val="tx1"/>
-            </a:solidFill>
+            <a:noFill/>
             <a:prstDash val="lgDash"/>
           </a:ln>
-          <a:effectLst/>
+          <a:effectLst>
+            <a:outerShdw blurRad="50800" dist="38100" dir="2700000" algn="tl" rotWithShape="0">
+              <a:prstClr val="black">
+                <a:alpha val="40000"/>
+              </a:prstClr>
+            </a:outerShdw>
+            <a:softEdge rad="635000"/>
+          </a:effectLst>
         </p:spPr>
         <p:style>
           <a:lnRef idx="2">
@@ -3395,14 +3412,14 @@
           <a:p>
             <a:pPr algn="ctr"/>
             <a:r>
-              <a:rPr lang="en-US" sz="6600" dirty="0" smtClean="0">
+              <a:rPr lang="en-US" sz="9600" dirty="0" smtClean="0">
                 <a:solidFill>
                   <a:schemeClr val="tx1"/>
                 </a:solidFill>
               </a:rPr>
-              <a:t>7</a:t>
-            </a:r>
-            <a:endParaRPr lang="en-US" sz="6600" dirty="0">
+              <a:t>6</a:t>
+            </a:r>
+            <a:endParaRPr lang="en-US" sz="9600" dirty="0">
               <a:solidFill>
                 <a:schemeClr val="tx1"/>
               </a:solidFill>
@@ -3412,29 +3429,35 @@
       </p:sp>
       <p:sp>
         <p:nvSpPr>
-          <p:cNvPr id="16" name="Rectangle 15"/>
+          <p:cNvPr id="15" name="Rectangle 14"/>
           <p:cNvSpPr/>
           <p:nvPr/>
         </p:nvSpPr>
         <p:spPr>
           <a:xfrm>
-            <a:off x="9078735" y="1718944"/>
-            <a:ext cx="2940903" cy="1584344"/>
+            <a:off x="6073826" y="1718944"/>
+            <a:ext cx="2940902" cy="1783708"/>
           </a:xfrm>
           <a:prstGeom prst="rect">
             <a:avLst/>
           </a:prstGeom>
-          <a:blipFill>
-            <a:blip r:embed="rId2"/>
-            <a:tile tx="0" ty="0" sx="100000" sy="100000" flip="none" algn="tl"/>
-          </a:blipFill>
+          <a:solidFill>
+            <a:schemeClr val="bg1">
+              <a:lumMod val="95000"/>
+            </a:schemeClr>
+          </a:solidFill>
           <a:ln>
-            <a:solidFill>
-              <a:schemeClr val="tx1"/>
-            </a:solidFill>
+            <a:noFill/>
             <a:prstDash val="lgDash"/>
           </a:ln>
-          <a:effectLst/>
+          <a:effectLst>
+            <a:outerShdw blurRad="50800" dist="38100" dir="2700000" algn="tl" rotWithShape="0">
+              <a:prstClr val="black">
+                <a:alpha val="40000"/>
+              </a:prstClr>
+            </a:outerShdw>
+            <a:softEdge rad="635000"/>
+          </a:effectLst>
         </p:spPr>
         <p:style>
           <a:lnRef idx="2">
@@ -3458,14 +3481,14 @@
           <a:p>
             <a:pPr algn="ctr"/>
             <a:r>
-              <a:rPr lang="en-US" sz="6600" dirty="0" smtClean="0">
+              <a:rPr lang="en-US" sz="9600" dirty="0" smtClean="0">
                 <a:solidFill>
                   <a:schemeClr val="tx1"/>
                 </a:solidFill>
               </a:rPr>
-              <a:t>8</a:t>
-            </a:r>
-            <a:endParaRPr lang="en-US" sz="6600" dirty="0">
+              <a:t>7</a:t>
+            </a:r>
+            <a:endParaRPr lang="en-US" sz="9600" dirty="0">
               <a:solidFill>
                 <a:schemeClr val="tx1"/>
               </a:solidFill>
@@ -3475,29 +3498,35 @@
       </p:sp>
       <p:sp>
         <p:nvSpPr>
-          <p:cNvPr id="17" name="Rectangle 16"/>
+          <p:cNvPr id="16" name="Rectangle 15"/>
           <p:cNvSpPr/>
           <p:nvPr/>
         </p:nvSpPr>
         <p:spPr>
           <a:xfrm>
-            <a:off x="64008" y="3401568"/>
-            <a:ext cx="2940902" cy="1582680"/>
+            <a:off x="9078735" y="1718944"/>
+            <a:ext cx="2940903" cy="1783708"/>
           </a:xfrm>
           <a:prstGeom prst="rect">
             <a:avLst/>
           </a:prstGeom>
-          <a:blipFill>
-            <a:blip r:embed="rId2"/>
-            <a:tile tx="0" ty="0" sx="100000" sy="100000" flip="none" algn="tl"/>
-          </a:blipFill>
+          <a:solidFill>
+            <a:schemeClr val="bg1">
+              <a:lumMod val="95000"/>
+            </a:schemeClr>
+          </a:solidFill>
           <a:ln>
-            <a:solidFill>
-              <a:schemeClr val="tx1"/>
-            </a:solidFill>
+            <a:noFill/>
             <a:prstDash val="lgDash"/>
           </a:ln>
-          <a:effectLst/>
+          <a:effectLst>
+            <a:outerShdw blurRad="50800" dist="38100" dir="2700000" algn="tl" rotWithShape="0">
+              <a:prstClr val="black">
+                <a:alpha val="40000"/>
+              </a:prstClr>
+            </a:outerShdw>
+            <a:softEdge rad="635000"/>
+          </a:effectLst>
         </p:spPr>
         <p:style>
           <a:lnRef idx="2">
@@ -3521,14 +3550,14 @@
           <a:p>
             <a:pPr algn="ctr"/>
             <a:r>
-              <a:rPr lang="en-US" sz="6600" dirty="0" smtClean="0">
+              <a:rPr lang="en-US" sz="9600" dirty="0" smtClean="0">
                 <a:solidFill>
                   <a:schemeClr val="tx1"/>
                 </a:solidFill>
               </a:rPr>
-              <a:t>9</a:t>
-            </a:r>
-            <a:endParaRPr lang="en-US" sz="6600" dirty="0">
+              <a:t>8</a:t>
+            </a:r>
+            <a:endParaRPr lang="en-US" sz="9600" dirty="0">
               <a:solidFill>
                 <a:schemeClr val="tx1"/>
               </a:solidFill>
@@ -3538,29 +3567,35 @@
       </p:sp>
       <p:sp>
         <p:nvSpPr>
-          <p:cNvPr id="18" name="Rectangle 17"/>
+          <p:cNvPr id="17" name="Rectangle 16"/>
           <p:cNvSpPr/>
           <p:nvPr/>
         </p:nvSpPr>
         <p:spPr>
           <a:xfrm>
-            <a:off x="3068916" y="3401568"/>
-            <a:ext cx="2940903" cy="1582680"/>
+            <a:off x="64008" y="3401567"/>
+            <a:ext cx="2940902" cy="1781835"/>
           </a:xfrm>
           <a:prstGeom prst="rect">
             <a:avLst/>
           </a:prstGeom>
-          <a:blipFill>
-            <a:blip r:embed="rId2"/>
-            <a:tile tx="0" ty="0" sx="100000" sy="100000" flip="none" algn="tl"/>
-          </a:blipFill>
+          <a:solidFill>
+            <a:schemeClr val="bg1">
+              <a:lumMod val="95000"/>
+            </a:schemeClr>
+          </a:solidFill>
           <a:ln>
-            <a:solidFill>
-              <a:schemeClr val="tx1"/>
-            </a:solidFill>
+            <a:noFill/>
             <a:prstDash val="lgDash"/>
           </a:ln>
-          <a:effectLst/>
+          <a:effectLst>
+            <a:outerShdw blurRad="50800" dist="38100" dir="2700000" algn="tl" rotWithShape="0">
+              <a:prstClr val="black">
+                <a:alpha val="40000"/>
+              </a:prstClr>
+            </a:outerShdw>
+            <a:softEdge rad="635000"/>
+          </a:effectLst>
         </p:spPr>
         <p:style>
           <a:lnRef idx="2">
@@ -3584,14 +3619,14 @@
           <a:p>
             <a:pPr algn="ctr"/>
             <a:r>
-              <a:rPr lang="en-US" sz="6600" dirty="0" smtClean="0">
+              <a:rPr lang="en-US" sz="9600" dirty="0" smtClean="0">
                 <a:solidFill>
                   <a:schemeClr val="tx1"/>
                 </a:solidFill>
               </a:rPr>
-              <a:t>10</a:t>
-            </a:r>
-            <a:endParaRPr lang="en-US" sz="6600" dirty="0">
+              <a:t>9</a:t>
+            </a:r>
+            <a:endParaRPr lang="en-US" sz="9600" dirty="0">
               <a:solidFill>
                 <a:schemeClr val="tx1"/>
               </a:solidFill>
@@ -3601,29 +3636,35 @@
       </p:sp>
       <p:sp>
         <p:nvSpPr>
-          <p:cNvPr id="19" name="Rectangle 18"/>
+          <p:cNvPr id="18" name="Rectangle 17"/>
           <p:cNvSpPr/>
           <p:nvPr/>
         </p:nvSpPr>
         <p:spPr>
           <a:xfrm>
-            <a:off x="6073826" y="3401568"/>
-            <a:ext cx="2940902" cy="1590672"/>
+            <a:off x="3068916" y="3401567"/>
+            <a:ext cx="2940903" cy="1781835"/>
           </a:xfrm>
           <a:prstGeom prst="rect">
             <a:avLst/>
           </a:prstGeom>
-          <a:blipFill>
-            <a:blip r:embed="rId2"/>
-            <a:tile tx="0" ty="0" sx="100000" sy="100000" flip="none" algn="tl"/>
-          </a:blipFill>
+          <a:solidFill>
+            <a:schemeClr val="bg1">
+              <a:lumMod val="95000"/>
+            </a:schemeClr>
+          </a:solidFill>
           <a:ln>
-            <a:solidFill>
-              <a:schemeClr val="tx1"/>
-            </a:solidFill>
+            <a:noFill/>
             <a:prstDash val="lgDash"/>
           </a:ln>
-          <a:effectLst/>
+          <a:effectLst>
+            <a:outerShdw blurRad="50800" dist="38100" dir="2700000" algn="tl" rotWithShape="0">
+              <a:prstClr val="black">
+                <a:alpha val="40000"/>
+              </a:prstClr>
+            </a:outerShdw>
+            <a:softEdge rad="635000"/>
+          </a:effectLst>
         </p:spPr>
         <p:style>
           <a:lnRef idx="2">
@@ -3647,14 +3688,14 @@
           <a:p>
             <a:pPr algn="ctr"/>
             <a:r>
-              <a:rPr lang="en-US" sz="6600" dirty="0" smtClean="0">
+              <a:rPr lang="en-US" sz="9600" dirty="0" smtClean="0">
                 <a:solidFill>
                   <a:schemeClr val="tx1"/>
                 </a:solidFill>
               </a:rPr>
-              <a:t>11</a:t>
-            </a:r>
-            <a:endParaRPr lang="en-US" sz="6600" dirty="0">
+              <a:t>10</a:t>
+            </a:r>
+            <a:endParaRPr lang="en-US" sz="9600" dirty="0">
               <a:solidFill>
                 <a:schemeClr val="tx1"/>
               </a:solidFill>
@@ -3664,29 +3705,35 @@
       </p:sp>
       <p:sp>
         <p:nvSpPr>
-          <p:cNvPr id="20" name="Rectangle 19"/>
+          <p:cNvPr id="19" name="Rectangle 18"/>
           <p:cNvSpPr/>
           <p:nvPr/>
         </p:nvSpPr>
         <p:spPr>
           <a:xfrm>
-            <a:off x="9078736" y="3401568"/>
-            <a:ext cx="2940902" cy="1582680"/>
+            <a:off x="6073826" y="3401567"/>
+            <a:ext cx="2940902" cy="1790833"/>
           </a:xfrm>
           <a:prstGeom prst="rect">
             <a:avLst/>
           </a:prstGeom>
-          <a:blipFill>
-            <a:blip r:embed="rId2"/>
-            <a:tile tx="0" ty="0" sx="100000" sy="100000" flip="none" algn="tl"/>
-          </a:blipFill>
+          <a:solidFill>
+            <a:schemeClr val="bg1">
+              <a:lumMod val="95000"/>
+            </a:schemeClr>
+          </a:solidFill>
           <a:ln>
-            <a:solidFill>
-              <a:schemeClr val="tx1"/>
-            </a:solidFill>
+            <a:noFill/>
             <a:prstDash val="lgDash"/>
           </a:ln>
-          <a:effectLst/>
+          <a:effectLst>
+            <a:outerShdw blurRad="50800" dist="38100" dir="2700000" algn="tl" rotWithShape="0">
+              <a:prstClr val="black">
+                <a:alpha val="40000"/>
+              </a:prstClr>
+            </a:outerShdw>
+            <a:softEdge rad="635000"/>
+          </a:effectLst>
         </p:spPr>
         <p:style>
           <a:lnRef idx="2">
@@ -3710,14 +3757,14 @@
           <a:p>
             <a:pPr algn="ctr"/>
             <a:r>
-              <a:rPr lang="en-US" sz="6600" dirty="0" smtClean="0">
+              <a:rPr lang="en-US" sz="9600" dirty="0" smtClean="0">
                 <a:solidFill>
                   <a:schemeClr val="tx1"/>
                 </a:solidFill>
               </a:rPr>
-              <a:t>12</a:t>
-            </a:r>
-            <a:endParaRPr lang="en-US" sz="6600" dirty="0">
+              <a:t>11</a:t>
+            </a:r>
+            <a:endParaRPr lang="en-US" sz="9600" dirty="0">
               <a:solidFill>
                 <a:schemeClr val="tx1"/>
               </a:solidFill>
@@ -3727,29 +3774,35 @@
       </p:sp>
       <p:sp>
         <p:nvSpPr>
-          <p:cNvPr id="21" name="Rectangle 20"/>
+          <p:cNvPr id="20" name="Rectangle 19"/>
           <p:cNvSpPr/>
           <p:nvPr/>
         </p:nvSpPr>
         <p:spPr>
           <a:xfrm>
-            <a:off x="64008" y="5055864"/>
-            <a:ext cx="2940902" cy="1600712"/>
+            <a:off x="9078736" y="3401567"/>
+            <a:ext cx="2940902" cy="1781835"/>
           </a:xfrm>
           <a:prstGeom prst="rect">
             <a:avLst/>
           </a:prstGeom>
-          <a:blipFill>
-            <a:blip r:embed="rId2"/>
-            <a:tile tx="0" ty="0" sx="100000" sy="100000" flip="none" algn="tl"/>
-          </a:blipFill>
+          <a:solidFill>
+            <a:schemeClr val="bg1">
+              <a:lumMod val="95000"/>
+            </a:schemeClr>
+          </a:solidFill>
           <a:ln>
-            <a:solidFill>
-              <a:schemeClr val="tx1"/>
-            </a:solidFill>
+            <a:noFill/>
             <a:prstDash val="lgDash"/>
           </a:ln>
-          <a:effectLst/>
+          <a:effectLst>
+            <a:outerShdw blurRad="50800" dist="38100" dir="2700000" algn="tl" rotWithShape="0">
+              <a:prstClr val="black">
+                <a:alpha val="40000"/>
+              </a:prstClr>
+            </a:outerShdw>
+            <a:softEdge rad="635000"/>
+          </a:effectLst>
         </p:spPr>
         <p:style>
           <a:lnRef idx="2">
@@ -3773,14 +3826,14 @@
           <a:p>
             <a:pPr algn="ctr"/>
             <a:r>
-              <a:rPr lang="en-US" sz="6600" dirty="0" smtClean="0">
+              <a:rPr lang="en-US" sz="9600" dirty="0" smtClean="0">
                 <a:solidFill>
                   <a:schemeClr val="tx1"/>
                 </a:solidFill>
               </a:rPr>
-              <a:t>13</a:t>
-            </a:r>
-            <a:endParaRPr lang="en-US" sz="6600" dirty="0">
+              <a:t>12</a:t>
+            </a:r>
+            <a:endParaRPr lang="en-US" sz="9600" dirty="0">
               <a:solidFill>
                 <a:schemeClr val="tx1"/>
               </a:solidFill>
@@ -3790,29 +3843,35 @@
       </p:sp>
       <p:sp>
         <p:nvSpPr>
-          <p:cNvPr id="22" name="Rectangle 21"/>
+          <p:cNvPr id="21" name="Rectangle 20"/>
           <p:cNvSpPr/>
           <p:nvPr/>
         </p:nvSpPr>
         <p:spPr>
           <a:xfrm>
-            <a:off x="3068916" y="5055864"/>
-            <a:ext cx="2940903" cy="1600712"/>
+            <a:off x="64008" y="5055864"/>
+            <a:ext cx="2940902" cy="1802136"/>
           </a:xfrm>
           <a:prstGeom prst="rect">
             <a:avLst/>
           </a:prstGeom>
-          <a:blipFill>
-            <a:blip r:embed="rId2"/>
-            <a:tile tx="0" ty="0" sx="100000" sy="100000" flip="none" algn="tl"/>
-          </a:blipFill>
+          <a:solidFill>
+            <a:schemeClr val="bg1">
+              <a:lumMod val="95000"/>
+            </a:schemeClr>
+          </a:solidFill>
           <a:ln>
-            <a:solidFill>
-              <a:schemeClr val="tx1"/>
-            </a:solidFill>
+            <a:noFill/>
             <a:prstDash val="lgDash"/>
           </a:ln>
-          <a:effectLst/>
+          <a:effectLst>
+            <a:outerShdw blurRad="50800" dist="38100" dir="2700000" algn="tl" rotWithShape="0">
+              <a:prstClr val="black">
+                <a:alpha val="40000"/>
+              </a:prstClr>
+            </a:outerShdw>
+            <a:softEdge rad="635000"/>
+          </a:effectLst>
         </p:spPr>
         <p:style>
           <a:lnRef idx="2">
@@ -3836,14 +3895,14 @@
           <a:p>
             <a:pPr algn="ctr"/>
             <a:r>
-              <a:rPr lang="en-US" sz="6600" dirty="0" smtClean="0">
+              <a:rPr lang="en-US" sz="9600" dirty="0" smtClean="0">
                 <a:solidFill>
                   <a:schemeClr val="tx1"/>
                 </a:solidFill>
               </a:rPr>
-              <a:t>14</a:t>
-            </a:r>
-            <a:endParaRPr lang="en-US" sz="6600" dirty="0">
+              <a:t>13</a:t>
+            </a:r>
+            <a:endParaRPr lang="en-US" sz="9600" dirty="0">
               <a:solidFill>
                 <a:schemeClr val="tx1"/>
               </a:solidFill>
@@ -3853,29 +3912,35 @@
       </p:sp>
       <p:sp>
         <p:nvSpPr>
-          <p:cNvPr id="23" name="Rectangle 22"/>
+          <p:cNvPr id="22" name="Rectangle 21"/>
           <p:cNvSpPr/>
           <p:nvPr/>
         </p:nvSpPr>
         <p:spPr>
           <a:xfrm>
-            <a:off x="6073825" y="5072104"/>
-            <a:ext cx="2940902" cy="1600712"/>
+            <a:off x="3068916" y="5055864"/>
+            <a:ext cx="2940903" cy="1802136"/>
           </a:xfrm>
           <a:prstGeom prst="rect">
             <a:avLst/>
           </a:prstGeom>
-          <a:blipFill>
-            <a:blip r:embed="rId2"/>
-            <a:tile tx="0" ty="0" sx="100000" sy="100000" flip="none" algn="tl"/>
-          </a:blipFill>
+          <a:solidFill>
+            <a:schemeClr val="bg1">
+              <a:lumMod val="95000"/>
+            </a:schemeClr>
+          </a:solidFill>
           <a:ln>
-            <a:solidFill>
-              <a:schemeClr val="tx1"/>
-            </a:solidFill>
+            <a:noFill/>
             <a:prstDash val="lgDash"/>
           </a:ln>
-          <a:effectLst/>
+          <a:effectLst>
+            <a:outerShdw blurRad="50800" dist="38100" dir="2700000" algn="tl" rotWithShape="0">
+              <a:prstClr val="black">
+                <a:alpha val="40000"/>
+              </a:prstClr>
+            </a:outerShdw>
+            <a:softEdge rad="635000"/>
+          </a:effectLst>
         </p:spPr>
         <p:style>
           <a:lnRef idx="2">
@@ -3899,14 +3964,83 @@
           <a:p>
             <a:pPr algn="ctr"/>
             <a:r>
-              <a:rPr lang="en-US" sz="6600" dirty="0" smtClean="0">
+              <a:rPr lang="en-US" sz="9600" dirty="0" smtClean="0">
+                <a:solidFill>
+                  <a:schemeClr val="tx1"/>
+                </a:solidFill>
+              </a:rPr>
+              <a:t>14</a:t>
+            </a:r>
+            <a:endParaRPr lang="en-US" sz="9600" dirty="0">
+              <a:solidFill>
+                <a:schemeClr val="tx1"/>
+              </a:solidFill>
+            </a:endParaRPr>
+          </a:p>
+        </p:txBody>
+      </p:sp>
+      <p:sp>
+        <p:nvSpPr>
+          <p:cNvPr id="23" name="Rectangle 22"/>
+          <p:cNvSpPr/>
+          <p:nvPr/>
+        </p:nvSpPr>
+        <p:spPr>
+          <a:xfrm>
+            <a:off x="6073825" y="5072104"/>
+            <a:ext cx="2940902" cy="1802136"/>
+          </a:xfrm>
+          <a:prstGeom prst="rect">
+            <a:avLst/>
+          </a:prstGeom>
+          <a:solidFill>
+            <a:schemeClr val="bg1">
+              <a:lumMod val="95000"/>
+            </a:schemeClr>
+          </a:solidFill>
+          <a:ln>
+            <a:noFill/>
+            <a:prstDash val="lgDash"/>
+          </a:ln>
+          <a:effectLst>
+            <a:outerShdw blurRad="50800" dist="38100" dir="2700000" algn="tl" rotWithShape="0">
+              <a:prstClr val="black">
+                <a:alpha val="40000"/>
+              </a:prstClr>
+            </a:outerShdw>
+            <a:softEdge rad="635000"/>
+          </a:effectLst>
+        </p:spPr>
+        <p:style>
+          <a:lnRef idx="2">
+            <a:schemeClr val="accent1">
+              <a:shade val="50000"/>
+            </a:schemeClr>
+          </a:lnRef>
+          <a:fillRef idx="1">
+            <a:schemeClr val="accent1"/>
+          </a:fillRef>
+          <a:effectRef idx="0">
+            <a:schemeClr val="accent1"/>
+          </a:effectRef>
+          <a:fontRef idx="minor">
+            <a:schemeClr val="lt1"/>
+          </a:fontRef>
+        </p:style>
+        <p:txBody>
+          <a:bodyPr rtlCol="0" anchor="ctr"/>
+          <a:lstStyle/>
+          <a:p>
+            <a:pPr algn="ctr"/>
+            <a:r>
+              <a:rPr lang="en-US" sz="9600" dirty="0" smtClean="0">
                 <a:solidFill>
                   <a:schemeClr val="tx1"/>
                 </a:solidFill>
               </a:rPr>
               <a:t>15</a:t>
             </a:r>
-            <a:endParaRPr lang="en-US" sz="6600" dirty="0">
+            <a:endParaRPr lang="en-US" sz="9600" dirty="0">
               <a:solidFill>
                 <a:schemeClr val="tx1"/>
               </a:solidFill>

</xml_diff>